<commit_message>
*** ppt + images
</commit_message>
<xml_diff>
--- a/ThesisDoc/IOSharp.pptx
+++ b/ThesisDoc/IOSharp.pptx
@@ -5,7 +5,7 @@
     <p:sldMasterId id="2147483821" r:id="rId1"/>
   </p:sldMasterIdLst>
   <p:notesMasterIdLst>
-    <p:notesMasterId r:id="rId19"/>
+    <p:notesMasterId r:id="rId23"/>
   </p:notesMasterIdLst>
   <p:sldIdLst>
     <p:sldId id="256" r:id="rId2"/>
@@ -18,13 +18,17 @@
     <p:sldId id="273" r:id="rId9"/>
     <p:sldId id="263" r:id="rId10"/>
     <p:sldId id="264" r:id="rId11"/>
-    <p:sldId id="265" r:id="rId12"/>
-    <p:sldId id="266" r:id="rId13"/>
-    <p:sldId id="267" r:id="rId14"/>
-    <p:sldId id="268" r:id="rId15"/>
-    <p:sldId id="269" r:id="rId16"/>
-    <p:sldId id="270" r:id="rId17"/>
-    <p:sldId id="271" r:id="rId18"/>
+    <p:sldId id="274" r:id="rId12"/>
+    <p:sldId id="265" r:id="rId13"/>
+    <p:sldId id="266" r:id="rId14"/>
+    <p:sldId id="276" r:id="rId15"/>
+    <p:sldId id="275" r:id="rId16"/>
+    <p:sldId id="267" r:id="rId17"/>
+    <p:sldId id="268" r:id="rId18"/>
+    <p:sldId id="269" r:id="rId19"/>
+    <p:sldId id="270" r:id="rId20"/>
+    <p:sldId id="277" r:id="rId21"/>
+    <p:sldId id="271" r:id="rId22"/>
   </p:sldIdLst>
   <p:sldSz cx="9144000" cy="6858000" type="screen4x3"/>
   <p:notesSz cx="6858000" cy="9144000"/>
@@ -224,7 +228,7 @@
           <a:p>
             <a:fld id="{7372D0EB-124A-4188-9A04-F78DFD96931D}" type="datetimeFigureOut">
               <a:rPr lang="en-US" smtClean="0"/>
-              <a:t>2/8/2014</a:t>
+              <a:t>2/9/2014</a:t>
             </a:fld>
             <a:endParaRPr lang="en-US"/>
           </a:p>
@@ -725,7 +729,7 @@
           <a:p>
             <a:fld id="{0353FF77-1486-40B6-B94E-C1E50A1A5E63}" type="slidenum">
               <a:rPr lang="en-US" smtClean="0"/>
-              <a:t>17</a:t>
+              <a:t>21</a:t>
             </a:fld>
             <a:endParaRPr lang="en-US"/>
           </a:p>
@@ -962,7 +966,7 @@
           <a:p>
             <a:fld id="{9D3E2F9D-38DA-4D6F-8E02-326E69AF2943}" type="datetime1">
               <a:rPr lang="es-ES" smtClean="0"/>
-              <a:t>08/02/2014</a:t>
+              <a:t>09/02/2014</a:t>
             </a:fld>
             <a:endParaRPr lang="es-ES" dirty="0"/>
           </a:p>
@@ -1310,7 +1314,7 @@
           <a:p>
             <a:fld id="{A66FE1B6-4F57-4445-A278-A5087723B883}" type="datetime1">
               <a:rPr lang="es-ES" smtClean="0"/>
-              <a:t>08/02/2014</a:t>
+              <a:t>09/02/2014</a:t>
             </a:fld>
             <a:endParaRPr lang="es-ES"/>
           </a:p>
@@ -1713,7 +1717,7 @@
           <a:p>
             <a:fld id="{F60366B5-A022-408C-B6C4-577A2E9117A4}" type="datetime1">
               <a:rPr lang="es-ES" smtClean="0"/>
-              <a:t>08/02/2014</a:t>
+              <a:t>09/02/2014</a:t>
             </a:fld>
             <a:endParaRPr lang="es-ES"/>
           </a:p>
@@ -2051,7 +2055,7 @@
           <a:p>
             <a:fld id="{87D6D524-B0FA-4292-AD14-EDC17503A51D}" type="datetime1">
               <a:rPr lang="es-ES" smtClean="0"/>
-              <a:t>08/02/2014</a:t>
+              <a:t>09/02/2014</a:t>
             </a:fld>
             <a:endParaRPr lang="es-ES"/>
           </a:p>
@@ -2373,7 +2377,7 @@
           <a:p>
             <a:fld id="{562FCECA-A66D-4047-8040-1EB238554101}" type="datetime1">
               <a:rPr lang="es-ES" smtClean="0"/>
-              <a:t>08/02/2014</a:t>
+              <a:t>09/02/2014</a:t>
             </a:fld>
             <a:endParaRPr lang="es-ES"/>
           </a:p>
@@ -2771,7 +2775,7 @@
           <a:p>
             <a:fld id="{769DFE57-26CB-48BC-91AD-9E207F38B65C}" type="datetime1">
               <a:rPr lang="es-ES" smtClean="0"/>
-              <a:t>08/02/2014</a:t>
+              <a:t>09/02/2014</a:t>
             </a:fld>
             <a:endParaRPr lang="es-ES"/>
           </a:p>
@@ -3030,7 +3034,7 @@
           <a:p>
             <a:fld id="{F92C9852-2065-40E2-8EB3-DADA6E88D2E4}" type="datetime1">
               <a:rPr lang="es-ES" smtClean="0"/>
-              <a:t>08/02/2014</a:t>
+              <a:t>09/02/2014</a:t>
             </a:fld>
             <a:endParaRPr lang="es-ES"/>
           </a:p>
@@ -3294,7 +3298,7 @@
           <a:p>
             <a:fld id="{69939F70-6665-4FEA-B09D-F1DBBA1D2266}" type="datetime1">
               <a:rPr lang="es-ES" smtClean="0"/>
-              <a:t>08/02/2014</a:t>
+              <a:t>09/02/2014</a:t>
             </a:fld>
             <a:endParaRPr lang="es-ES"/>
           </a:p>
@@ -3558,7 +3562,7 @@
           <a:p>
             <a:fld id="{C886E45F-F48B-47F5-A680-8D9C3D769D00}" type="datetime1">
               <a:rPr lang="es-ES" smtClean="0"/>
-              <a:t>08/02/2014</a:t>
+              <a:t>09/02/2014</a:t>
             </a:fld>
             <a:endParaRPr lang="es-ES"/>
           </a:p>
@@ -3905,7 +3909,7 @@
           <a:p>
             <a:fld id="{F3A88BA9-DB36-4996-99CF-7554617F1CC7}" type="datetime1">
               <a:rPr lang="es-ES" smtClean="0"/>
-              <a:t>08/02/2014</a:t>
+              <a:t>09/02/2014</a:t>
             </a:fld>
             <a:endParaRPr lang="es-ES"/>
           </a:p>
@@ -4234,7 +4238,7 @@
           <a:p>
             <a:fld id="{FFE94359-F0B4-4B76-BFCA-EDD95B71FCAC}" type="datetime1">
               <a:rPr lang="es-ES" smtClean="0"/>
-              <a:t>08/02/2014</a:t>
+              <a:t>09/02/2014</a:t>
             </a:fld>
             <a:endParaRPr lang="es-ES"/>
           </a:p>
@@ -4693,7 +4697,7 @@
           <a:p>
             <a:fld id="{35834B84-D7F6-4436-97FD-521439A9BF19}" type="datetime1">
               <a:rPr lang="es-ES" smtClean="0"/>
-              <a:t>08/02/2014</a:t>
+              <a:t>09/02/2014</a:t>
             </a:fld>
             <a:endParaRPr lang="es-ES"/>
           </a:p>
@@ -4905,7 +4909,7 @@
           <a:p>
             <a:fld id="{6C944476-9E3F-486C-BDC8-310F1AAD8AE6}" type="datetime1">
               <a:rPr lang="es-ES" smtClean="0"/>
-              <a:t>08/02/2014</a:t>
+              <a:t>09/02/2014</a:t>
             </a:fld>
             <a:endParaRPr lang="es-ES"/>
           </a:p>
@@ -5084,7 +5088,7 @@
           <a:p>
             <a:fld id="{B95C774B-50AF-47D8-9EDF-9B6AFC85D210}" type="datetime1">
               <a:rPr lang="es-ES" smtClean="0"/>
-              <a:t>08/02/2014</a:t>
+              <a:t>09/02/2014</a:t>
             </a:fld>
             <a:endParaRPr lang="es-ES"/>
           </a:p>
@@ -5419,7 +5423,7 @@
           <a:p>
             <a:fld id="{175269D3-134E-48AB-AA12-FE4B7076A3FD}" type="datetime1">
               <a:rPr lang="es-ES" smtClean="0"/>
-              <a:t>08/02/2014</a:t>
+              <a:t>09/02/2014</a:t>
             </a:fld>
             <a:endParaRPr lang="es-ES"/>
           </a:p>
@@ -5766,7 +5770,7 @@
           <a:p>
             <a:fld id="{63F2DCCE-F6CE-4BB5-ABD4-6B29C74F5768}" type="datetime1">
               <a:rPr lang="es-ES" smtClean="0"/>
-              <a:t>08/02/2014</a:t>
+              <a:t>09/02/2014</a:t>
             </a:fld>
             <a:endParaRPr lang="es-ES"/>
           </a:p>
@@ -7885,7 +7889,7 @@
           <a:p>
             <a:fld id="{0CD20DCD-2AE2-401E-BE39-52B8E760BC6B}" type="datetime1">
               <a:rPr lang="es-ES" smtClean="0"/>
-              <a:t>08/02/2014</a:t>
+              <a:t>09/02/2014</a:t>
             </a:fld>
             <a:endParaRPr lang="es-ES" dirty="0"/>
           </a:p>
@@ -8695,36 +8699,9 @@
           <a:p>
             <a:r>
               <a:rPr lang="es-ES" dirty="0" smtClean="0"/>
-              <a:t>2.4. </a:t>
-            </a:r>
-            <a:r>
-              <a:rPr lang="es-ES" dirty="0" smtClean="0"/>
-              <a:t> </a:t>
-            </a:r>
-            <a:r>
-              <a:rPr lang="es-ES" dirty="0" smtClean="0"/>
-              <a:t>UART</a:t>
+              <a:t>2.4.  UART</a:t>
             </a:r>
             <a:endParaRPr lang="en-US" dirty="0"/>
-          </a:p>
-        </p:txBody>
-      </p:sp>
-      <p:sp>
-        <p:nvSpPr>
-          <p:cNvPr id="3" name="Marcador de contenido 2"/>
-          <p:cNvSpPr>
-            <a:spLocks noGrp="1"/>
-          </p:cNvSpPr>
-          <p:nvPr>
-            <p:ph idx="1"/>
-          </p:nvPr>
-        </p:nvSpPr>
-        <p:spPr/>
-        <p:txBody>
-          <a:bodyPr/>
-          <a:lstStyle/>
-          <a:p>
-            <a:endParaRPr lang="en-US"/>
           </a:p>
         </p:txBody>
       </p:sp>
@@ -8771,6 +8748,129 @@
               <a:t>10</a:t>
             </a:fld>
             <a:endParaRPr lang="es-ES"/>
+          </a:p>
+        </p:txBody>
+      </p:sp>
+      <p:sp>
+        <p:nvSpPr>
+          <p:cNvPr id="11" name="Marcador de contenido 2"/>
+          <p:cNvSpPr>
+            <a:spLocks noGrp="1"/>
+          </p:cNvSpPr>
+          <p:nvPr>
+            <p:ph idx="1"/>
+          </p:nvPr>
+        </p:nvSpPr>
+        <p:spPr>
+          <a:xfrm>
+            <a:off x="1943807" y="1700808"/>
+            <a:ext cx="6591985" cy="3777622"/>
+          </a:xfrm>
+        </p:spPr>
+        <p:txBody>
+          <a:bodyPr/>
+          <a:lstStyle/>
+          <a:p>
+            <a:r>
+              <a:rPr lang="en-US" dirty="0" smtClean="0"/>
+              <a:t>NETMF and .NET Framework where compared</a:t>
+            </a:r>
+          </a:p>
+          <a:p>
+            <a:pPr lvl="1"/>
+            <a:endParaRPr lang="en-US" dirty="0" smtClean="0"/>
+          </a:p>
+          <a:p>
+            <a:pPr lvl="1"/>
+            <a:r>
+              <a:rPr lang="en-US" dirty="0" smtClean="0"/>
+              <a:t>Same namespace </a:t>
+            </a:r>
+            <a:r>
+              <a:rPr lang="en-US" dirty="0" smtClean="0">
+                <a:sym typeface="Wingdings" panose="05000000000000000000" pitchFamily="2" charset="2"/>
+              </a:rPr>
+              <a:t> </a:t>
+            </a:r>
+            <a:r>
+              <a:rPr lang="en-US" dirty="0" err="1" smtClean="0">
+                <a:latin typeface="Consolas" panose="020B0609020204030204" pitchFamily="49" charset="0"/>
+                <a:cs typeface="Consolas" panose="020B0609020204030204" pitchFamily="49" charset="0"/>
+              </a:rPr>
+              <a:t>System.IO.Ports</a:t>
+            </a:r>
+            <a:endParaRPr lang="en-US" dirty="0" smtClean="0">
+              <a:latin typeface="Consolas" panose="020B0609020204030204" pitchFamily="49" charset="0"/>
+              <a:cs typeface="Consolas" panose="020B0609020204030204" pitchFamily="49" charset="0"/>
+            </a:endParaRPr>
+          </a:p>
+          <a:p>
+            <a:pPr lvl="1"/>
+            <a:endParaRPr lang="en-US" dirty="0" smtClean="0">
+              <a:latin typeface="+mj-lt"/>
+              <a:cs typeface="Consolas" panose="020B0609020204030204" pitchFamily="49" charset="0"/>
+            </a:endParaRPr>
+          </a:p>
+          <a:p>
+            <a:pPr lvl="1"/>
+            <a:r>
+              <a:rPr lang="en-US" dirty="0" smtClean="0">
+                <a:latin typeface="+mj-lt"/>
+                <a:cs typeface="Consolas" panose="020B0609020204030204" pitchFamily="49" charset="0"/>
+              </a:rPr>
+              <a:t>Required methods for </a:t>
+            </a:r>
+            <a:r>
+              <a:rPr lang="en-US" dirty="0" err="1" smtClean="0">
+                <a:latin typeface="+mj-lt"/>
+                <a:cs typeface="Consolas" panose="020B0609020204030204" pitchFamily="49" charset="0"/>
+              </a:rPr>
+              <a:t>HomeSense</a:t>
+            </a:r>
+            <a:r>
+              <a:rPr lang="en-US" dirty="0" smtClean="0">
+                <a:latin typeface="+mj-lt"/>
+                <a:cs typeface="Consolas" panose="020B0609020204030204" pitchFamily="49" charset="0"/>
+              </a:rPr>
+              <a:t> in both implementations</a:t>
+            </a:r>
+          </a:p>
+          <a:p>
+            <a:pPr lvl="1"/>
+            <a:endParaRPr lang="en-US" dirty="0">
+              <a:latin typeface="+mj-lt"/>
+              <a:cs typeface="Consolas" panose="020B0609020204030204" pitchFamily="49" charset="0"/>
+            </a:endParaRPr>
+          </a:p>
+          <a:p>
+            <a:r>
+              <a:rPr lang="en-US" dirty="0" smtClean="0">
+                <a:latin typeface="+mj-lt"/>
+                <a:cs typeface="Consolas" panose="020B0609020204030204" pitchFamily="49" charset="0"/>
+              </a:rPr>
+              <a:t>Avoided a new reimplementation.</a:t>
+            </a:r>
+          </a:p>
+          <a:p>
+            <a:pPr lvl="1"/>
+            <a:r>
+              <a:rPr lang="en-US" dirty="0" err="1" smtClean="0">
+                <a:latin typeface="+mj-lt"/>
+                <a:cs typeface="Consolas" panose="020B0609020204030204" pitchFamily="49" charset="0"/>
+              </a:rPr>
+              <a:t>IOSharp</a:t>
+            </a:r>
+            <a:r>
+              <a:rPr lang="en-US" dirty="0" smtClean="0">
+                <a:latin typeface="+mj-lt"/>
+                <a:cs typeface="Consolas" panose="020B0609020204030204" pitchFamily="49" charset="0"/>
+              </a:rPr>
+              <a:t> relays on Mono Serial Port (UART)</a:t>
+            </a:r>
+            <a:endParaRPr lang="en-US" dirty="0">
+              <a:latin typeface="+mj-lt"/>
+              <a:cs typeface="Consolas" panose="020B0609020204030204" pitchFamily="49" charset="0"/>
+            </a:endParaRPr>
           </a:p>
         </p:txBody>
       </p:sp>
@@ -8827,16 +8927,8 @@
           <a:lstStyle/>
           <a:p>
             <a:r>
-              <a:rPr lang="es-ES" dirty="0"/>
-              <a:t>3</a:t>
-            </a:r>
-            <a:r>
-              <a:rPr lang="es-ES" dirty="0" smtClean="0"/>
-              <a:t>.  </a:t>
-            </a:r>
-            <a:r>
-              <a:rPr lang="es-ES" dirty="0" err="1" smtClean="0"/>
-              <a:t>AlterNative</a:t>
+              <a:rPr lang="en-US" dirty="0" smtClean="0"/>
+              <a:t>2.5.  Example</a:t>
             </a:r>
             <a:endParaRPr lang="en-US" dirty="0"/>
           </a:p>
@@ -8857,7 +8949,28 @@
           <a:bodyPr/>
           <a:lstStyle/>
           <a:p>
-            <a:endParaRPr lang="en-US"/>
+            <a:endParaRPr lang="en-US" dirty="0" smtClean="0"/>
+          </a:p>
+          <a:p>
+            <a:endParaRPr lang="en-US" dirty="0"/>
+          </a:p>
+          <a:p>
+            <a:endParaRPr lang="en-US" dirty="0" smtClean="0"/>
+          </a:p>
+          <a:p>
+            <a:r>
+              <a:rPr lang="en-US" dirty="0" smtClean="0"/>
+              <a:t>Video showing </a:t>
+            </a:r>
+            <a:r>
+              <a:rPr lang="en-US" dirty="0" err="1" smtClean="0"/>
+              <a:t>HomeSense</a:t>
+            </a:r>
+            <a:r>
+              <a:rPr lang="en-US" dirty="0" smtClean="0"/>
+              <a:t> on Raspberry Pi</a:t>
+            </a:r>
+            <a:endParaRPr lang="en-US" dirty="0"/>
           </a:p>
         </p:txBody>
       </p:sp>
@@ -8880,7 +8993,7 @@
               <a:rPr lang="es-ES" smtClean="0"/>
               <a:t>IOSharp: .NET Micro Framework on Linux</a:t>
             </a:r>
-            <a:endParaRPr lang="es-ES"/>
+            <a:endParaRPr lang="es-ES" dirty="0"/>
           </a:p>
         </p:txBody>
       </p:sp>
@@ -8910,20 +9023,13 @@
     </p:spTree>
     <p:extLst>
       <p:ext uri="{BB962C8B-B14F-4D97-AF65-F5344CB8AC3E}">
-        <p14:creationId xmlns:p14="http://schemas.microsoft.com/office/powerpoint/2010/main" val="2343270711"/>
+        <p14:creationId xmlns:p14="http://schemas.microsoft.com/office/powerpoint/2010/main" val="3360471616"/>
       </p:ext>
     </p:extLst>
   </p:cSld>
   <p:clrMapOvr>
     <a:masterClrMapping/>
   </p:clrMapOvr>
-  <p:timing>
-    <p:tnLst>
-      <p:par>
-        <p:cTn id="1" dur="indefinite" restart="never" nodeType="tmRoot"/>
-      </p:par>
-    </p:tnLst>
-  </p:timing>
 </p:sld>
 </file>
 
@@ -8954,46 +9060,61 @@
             <p:ph type="title"/>
           </p:nvPr>
         </p:nvSpPr>
-        <p:spPr/>
-        <p:txBody>
-          <a:bodyPr/>
-          <a:lstStyle/>
-          <a:p>
-            <a:r>
-              <a:rPr lang="en-US" dirty="0" smtClean="0"/>
-              <a:t>3.1.  Translation</a:t>
+        <p:spPr>
+          <a:xfrm>
+            <a:off x="1945201" y="624110"/>
+            <a:ext cx="6589199" cy="947358"/>
+          </a:xfrm>
+        </p:spPr>
+        <p:txBody>
+          <a:bodyPr/>
+          <a:lstStyle/>
+          <a:p>
+            <a:r>
+              <a:rPr lang="es-ES" dirty="0"/>
+              <a:t>3</a:t>
             </a:r>
             <a:r>
               <a:rPr lang="es-ES" dirty="0" smtClean="0"/>
-              <a:t> </a:t>
-            </a:r>
-            <a:r>
-              <a:rPr lang="en-US" dirty="0" smtClean="0"/>
-              <a:t>process</a:t>
+              <a:t>.  </a:t>
+            </a:r>
+            <a:r>
+              <a:rPr lang="es-ES" dirty="0" err="1" smtClean="0"/>
+              <a:t>AlterNative</a:t>
             </a:r>
             <a:endParaRPr lang="en-US" dirty="0"/>
           </a:p>
         </p:txBody>
       </p:sp>
-      <p:sp>
-        <p:nvSpPr>
-          <p:cNvPr id="3" name="Marcador de contenido 2"/>
-          <p:cNvSpPr>
-            <a:spLocks noGrp="1"/>
-          </p:cNvSpPr>
+      <p:pic>
+        <p:nvPicPr>
+          <p:cNvPr id="6" name="Marcador de contenido 5"/>
+          <p:cNvPicPr>
+            <a:picLocks noGrp="1" noChangeAspect="1"/>
+          </p:cNvPicPr>
           <p:nvPr>
             <p:ph idx="1"/>
           </p:nvPr>
-        </p:nvSpPr>
-        <p:spPr/>
-        <p:txBody>
-          <a:bodyPr/>
-          <a:lstStyle/>
-          <a:p>
-            <a:endParaRPr lang="en-US" dirty="0"/>
-          </a:p>
-        </p:txBody>
-      </p:sp>
+        </p:nvPicPr>
+        <p:blipFill>
+          <a:blip r:embed="rId2">
+            <a:extLst>
+              <a:ext uri="{28A0092B-C50C-407E-A947-70E740481C1C}">
+                <a14:useLocalDpi xmlns:a14="http://schemas.microsoft.com/office/drawing/2010/main" val="0"/>
+              </a:ext>
+            </a:extLst>
+          </a:blip>
+          <a:stretch>
+            <a:fillRect/>
+          </a:stretch>
+        </p:blipFill>
+        <p:spPr>
+          <a:xfrm>
+            <a:off x="1942415" y="4437112"/>
+            <a:ext cx="6591300" cy="1569357"/>
+          </a:xfrm>
+        </p:spPr>
+      </p:pic>
       <p:sp>
         <p:nvSpPr>
           <p:cNvPr id="4" name="Marcador de pie de página 3"/>
@@ -9040,10 +9161,316 @@
           </a:p>
         </p:txBody>
       </p:sp>
+      <p:sp>
+        <p:nvSpPr>
+          <p:cNvPr id="7" name="Marcador de contenido 2"/>
+          <p:cNvSpPr txBox="1">
+            <a:spLocks/>
+          </p:cNvSpPr>
+          <p:nvPr/>
+        </p:nvSpPr>
+        <p:spPr>
+          <a:xfrm>
+            <a:off x="1941730" y="1700808"/>
+            <a:ext cx="6591985" cy="3777622"/>
+          </a:xfrm>
+          <a:prstGeom prst="rect">
+            <a:avLst/>
+          </a:prstGeom>
+        </p:spPr>
+        <p:txBody>
+          <a:bodyPr vert="horz" lIns="91440" tIns="45720" rIns="91440" bIns="45720" rtlCol="0">
+            <a:normAutofit/>
+          </a:bodyPr>
+          <a:lstStyle>
+            <a:lvl1pPr marL="342900" indent="-342900" algn="l" defTabSz="457200" rtl="0" eaLnBrk="1" latinLnBrk="0" hangingPunct="1">
+              <a:spcBef>
+                <a:spcPts val="1000"/>
+              </a:spcBef>
+              <a:spcAft>
+                <a:spcPts val="0"/>
+              </a:spcAft>
+              <a:buClr>
+                <a:schemeClr val="accent1"/>
+              </a:buClr>
+              <a:buFont typeface="Wingdings 3" charset="2"/>
+              <a:buChar char=""/>
+              <a:defRPr sz="1800" kern="1200">
+                <a:solidFill>
+                  <a:schemeClr val="tx1">
+                    <a:lumMod val="75000"/>
+                    <a:lumOff val="25000"/>
+                  </a:schemeClr>
+                </a:solidFill>
+                <a:latin typeface="+mn-lt"/>
+                <a:ea typeface="+mn-ea"/>
+                <a:cs typeface="+mn-cs"/>
+              </a:defRPr>
+            </a:lvl1pPr>
+            <a:lvl2pPr marL="742950" indent="-285750" algn="l" defTabSz="457200" rtl="0" eaLnBrk="1" latinLnBrk="0" hangingPunct="1">
+              <a:spcBef>
+                <a:spcPts val="1000"/>
+              </a:spcBef>
+              <a:spcAft>
+                <a:spcPts val="0"/>
+              </a:spcAft>
+              <a:buClr>
+                <a:schemeClr val="accent1"/>
+              </a:buClr>
+              <a:buFont typeface="Wingdings 3" charset="2"/>
+              <a:buChar char=""/>
+              <a:defRPr sz="1600" kern="1200">
+                <a:solidFill>
+                  <a:schemeClr val="tx1">
+                    <a:lumMod val="75000"/>
+                    <a:lumOff val="25000"/>
+                  </a:schemeClr>
+                </a:solidFill>
+                <a:latin typeface="+mn-lt"/>
+                <a:ea typeface="+mn-ea"/>
+                <a:cs typeface="+mn-cs"/>
+              </a:defRPr>
+            </a:lvl2pPr>
+            <a:lvl3pPr marL="1143000" indent="-228600" algn="l" defTabSz="457200" rtl="0" eaLnBrk="1" latinLnBrk="0" hangingPunct="1">
+              <a:spcBef>
+                <a:spcPts val="1000"/>
+              </a:spcBef>
+              <a:spcAft>
+                <a:spcPts val="0"/>
+              </a:spcAft>
+              <a:buClr>
+                <a:schemeClr val="accent1"/>
+              </a:buClr>
+              <a:buFont typeface="Wingdings 3" charset="2"/>
+              <a:buChar char=""/>
+              <a:defRPr sz="1400" kern="1200">
+                <a:solidFill>
+                  <a:schemeClr val="tx1">
+                    <a:lumMod val="75000"/>
+                    <a:lumOff val="25000"/>
+                  </a:schemeClr>
+                </a:solidFill>
+                <a:latin typeface="+mn-lt"/>
+                <a:ea typeface="+mn-ea"/>
+                <a:cs typeface="+mn-cs"/>
+              </a:defRPr>
+            </a:lvl3pPr>
+            <a:lvl4pPr marL="1600200" indent="-228600" algn="l" defTabSz="457200" rtl="0" eaLnBrk="1" latinLnBrk="0" hangingPunct="1">
+              <a:spcBef>
+                <a:spcPts val="1000"/>
+              </a:spcBef>
+              <a:spcAft>
+                <a:spcPts val="0"/>
+              </a:spcAft>
+              <a:buClr>
+                <a:schemeClr val="accent1"/>
+              </a:buClr>
+              <a:buFont typeface="Wingdings 3" charset="2"/>
+              <a:buChar char=""/>
+              <a:defRPr sz="1200" kern="1200">
+                <a:solidFill>
+                  <a:schemeClr val="tx1">
+                    <a:lumMod val="75000"/>
+                    <a:lumOff val="25000"/>
+                  </a:schemeClr>
+                </a:solidFill>
+                <a:latin typeface="+mn-lt"/>
+                <a:ea typeface="+mn-ea"/>
+                <a:cs typeface="+mn-cs"/>
+              </a:defRPr>
+            </a:lvl4pPr>
+            <a:lvl5pPr marL="2057400" indent="-228600" algn="l" defTabSz="457200" rtl="0" eaLnBrk="1" latinLnBrk="0" hangingPunct="1">
+              <a:spcBef>
+                <a:spcPts val="1000"/>
+              </a:spcBef>
+              <a:spcAft>
+                <a:spcPts val="0"/>
+              </a:spcAft>
+              <a:buClr>
+                <a:schemeClr val="accent1"/>
+              </a:buClr>
+              <a:buFont typeface="Wingdings 3" charset="2"/>
+              <a:buChar char=""/>
+              <a:defRPr sz="1200" kern="1200">
+                <a:solidFill>
+                  <a:schemeClr val="tx1">
+                    <a:lumMod val="75000"/>
+                    <a:lumOff val="25000"/>
+                  </a:schemeClr>
+                </a:solidFill>
+                <a:latin typeface="+mn-lt"/>
+                <a:ea typeface="+mn-ea"/>
+                <a:cs typeface="+mn-cs"/>
+              </a:defRPr>
+            </a:lvl5pPr>
+            <a:lvl6pPr marL="2514600" indent="-228600" algn="l" defTabSz="457200" rtl="0" eaLnBrk="1" latinLnBrk="0" hangingPunct="1">
+              <a:spcBef>
+                <a:spcPts val="1000"/>
+              </a:spcBef>
+              <a:spcAft>
+                <a:spcPts val="0"/>
+              </a:spcAft>
+              <a:buClr>
+                <a:schemeClr val="accent1"/>
+              </a:buClr>
+              <a:buFont typeface="Wingdings 3" charset="2"/>
+              <a:buChar char=""/>
+              <a:defRPr sz="1200" kern="1200">
+                <a:solidFill>
+                  <a:schemeClr val="tx1">
+                    <a:lumMod val="75000"/>
+                    <a:lumOff val="25000"/>
+                  </a:schemeClr>
+                </a:solidFill>
+                <a:latin typeface="+mn-lt"/>
+                <a:ea typeface="+mn-ea"/>
+                <a:cs typeface="+mn-cs"/>
+              </a:defRPr>
+            </a:lvl6pPr>
+            <a:lvl7pPr marL="2971800" indent="-228600" algn="l" defTabSz="457200" rtl="0" eaLnBrk="1" latinLnBrk="0" hangingPunct="1">
+              <a:spcBef>
+                <a:spcPts val="1000"/>
+              </a:spcBef>
+              <a:spcAft>
+                <a:spcPts val="0"/>
+              </a:spcAft>
+              <a:buClr>
+                <a:schemeClr val="accent1"/>
+              </a:buClr>
+              <a:buFont typeface="Wingdings 3" charset="2"/>
+              <a:buChar char=""/>
+              <a:defRPr sz="1200" kern="1200">
+                <a:solidFill>
+                  <a:schemeClr val="tx1">
+                    <a:lumMod val="75000"/>
+                    <a:lumOff val="25000"/>
+                  </a:schemeClr>
+                </a:solidFill>
+                <a:latin typeface="+mn-lt"/>
+                <a:ea typeface="+mn-ea"/>
+                <a:cs typeface="+mn-cs"/>
+              </a:defRPr>
+            </a:lvl7pPr>
+            <a:lvl8pPr marL="3429000" indent="-228600" algn="l" defTabSz="457200" rtl="0" eaLnBrk="1" latinLnBrk="0" hangingPunct="1">
+              <a:spcBef>
+                <a:spcPts val="1000"/>
+              </a:spcBef>
+              <a:spcAft>
+                <a:spcPts val="0"/>
+              </a:spcAft>
+              <a:buClr>
+                <a:schemeClr val="accent1"/>
+              </a:buClr>
+              <a:buFont typeface="Wingdings 3" charset="2"/>
+              <a:buChar char=""/>
+              <a:defRPr sz="1200" kern="1200">
+                <a:solidFill>
+                  <a:schemeClr val="tx1">
+                    <a:lumMod val="75000"/>
+                    <a:lumOff val="25000"/>
+                  </a:schemeClr>
+                </a:solidFill>
+                <a:latin typeface="+mn-lt"/>
+                <a:ea typeface="+mn-ea"/>
+                <a:cs typeface="+mn-cs"/>
+              </a:defRPr>
+            </a:lvl8pPr>
+            <a:lvl9pPr marL="3886200" indent="-228600" algn="l" defTabSz="457200" rtl="0" eaLnBrk="1" latinLnBrk="0" hangingPunct="1">
+              <a:spcBef>
+                <a:spcPts val="1000"/>
+              </a:spcBef>
+              <a:spcAft>
+                <a:spcPts val="0"/>
+              </a:spcAft>
+              <a:buClr>
+                <a:schemeClr val="accent1"/>
+              </a:buClr>
+              <a:buFont typeface="Wingdings 3" charset="2"/>
+              <a:buChar char=""/>
+              <a:defRPr sz="1200" kern="1200">
+                <a:solidFill>
+                  <a:schemeClr val="tx1">
+                    <a:lumMod val="75000"/>
+                    <a:lumOff val="25000"/>
+                  </a:schemeClr>
+                </a:solidFill>
+                <a:latin typeface="+mn-lt"/>
+                <a:ea typeface="+mn-ea"/>
+                <a:cs typeface="+mn-cs"/>
+              </a:defRPr>
+            </a:lvl9pPr>
+          </a:lstStyle>
+          <a:p>
+            <a:r>
+              <a:rPr lang="en-US" dirty="0" smtClean="0"/>
+              <a:t>Source code translator written in C#</a:t>
+            </a:r>
+          </a:p>
+          <a:p>
+            <a:r>
+              <a:rPr lang="en-US" dirty="0" smtClean="0"/>
+              <a:t>Translate a .NET Assembly to native C++</a:t>
+            </a:r>
+          </a:p>
+          <a:p>
+            <a:endParaRPr lang="en-US" dirty="0" smtClean="0"/>
+          </a:p>
+          <a:p>
+            <a:r>
+              <a:rPr lang="en-US" dirty="0" smtClean="0"/>
+              <a:t>Use cases:</a:t>
+            </a:r>
+          </a:p>
+          <a:p>
+            <a:pPr lvl="1"/>
+            <a:r>
+              <a:rPr lang="en-US" dirty="0" smtClean="0"/>
+              <a:t>Performance</a:t>
+            </a:r>
+          </a:p>
+          <a:p>
+            <a:pPr lvl="1"/>
+            <a:r>
+              <a:rPr lang="en-US" dirty="0" smtClean="0"/>
+              <a:t>Cross-Platform assembly generator</a:t>
+            </a:r>
+            <a:endParaRPr lang="en-US" dirty="0"/>
+          </a:p>
+        </p:txBody>
+      </p:sp>
+      <p:pic>
+        <p:nvPicPr>
+          <p:cNvPr id="9" name="Imagen 8"/>
+          <p:cNvPicPr>
+            <a:picLocks noChangeAspect="1"/>
+          </p:cNvPicPr>
+          <p:nvPr/>
+        </p:nvPicPr>
+        <p:blipFill rotWithShape="1">
+          <a:blip r:embed="rId3" cstate="print">
+            <a:extLst>
+              <a:ext uri="{28A0092B-C50C-407E-A947-70E740481C1C}">
+                <a14:useLocalDpi xmlns:a14="http://schemas.microsoft.com/office/drawing/2010/main" val="0"/>
+              </a:ext>
+            </a:extLst>
+          </a:blip>
+          <a:srcRect l="17713" t="4408" r="66537" b="54145"/>
+          <a:stretch/>
+        </p:blipFill>
+        <p:spPr>
+          <a:xfrm>
+            <a:off x="6444208" y="2387735"/>
+            <a:ext cx="1885721" cy="1885721"/>
+          </a:xfrm>
+          <a:prstGeom prst="rect">
+            <a:avLst/>
+          </a:prstGeom>
+        </p:spPr>
+      </p:pic>
     </p:spTree>
     <p:extLst>
       <p:ext uri="{BB962C8B-B14F-4D97-AF65-F5344CB8AC3E}">
-        <p14:creationId xmlns:p14="http://schemas.microsoft.com/office/powerpoint/2010/main" val="3895191232"/>
+        <p14:creationId xmlns:p14="http://schemas.microsoft.com/office/powerpoint/2010/main" val="2343270711"/>
       </p:ext>
     </p:extLst>
   </p:cSld>
@@ -9094,7 +9521,15 @@
           <a:p>
             <a:r>
               <a:rPr lang="en-US" dirty="0" smtClean="0"/>
-              <a:t>3.2.  Example</a:t>
+              <a:t>3.1.  Translation</a:t>
+            </a:r>
+            <a:r>
+              <a:rPr lang="es-ES" dirty="0" smtClean="0"/>
+              <a:t> </a:t>
+            </a:r>
+            <a:r>
+              <a:rPr lang="en-US" dirty="0" smtClean="0"/>
+              <a:t>process</a:t>
             </a:r>
             <a:endParaRPr lang="en-US" dirty="0"/>
           </a:p>
@@ -9115,7 +9550,7 @@
           <a:bodyPr/>
           <a:lstStyle/>
           <a:p>
-            <a:endParaRPr lang="en-US"/>
+            <a:endParaRPr lang="en-US" dirty="0"/>
           </a:p>
         </p:txBody>
       </p:sp>
@@ -9135,10 +9570,22 @@
           <a:lstStyle/>
           <a:p>
             <a:r>
-              <a:rPr lang="es-ES" smtClean="0"/>
-              <a:t>IOSharp: .NET Micro Framework on Linux</a:t>
-            </a:r>
-            <a:endParaRPr lang="es-ES"/>
+              <a:rPr lang="es-ES" dirty="0" err="1" smtClean="0"/>
+              <a:t>IOSharp</a:t>
+            </a:r>
+            <a:r>
+              <a:rPr lang="es-ES" dirty="0" smtClean="0"/>
+              <a:t>: .NET Micro Framework </a:t>
+            </a:r>
+            <a:r>
+              <a:rPr lang="es-ES" dirty="0" err="1" smtClean="0"/>
+              <a:t>on</a:t>
+            </a:r>
+            <a:r>
+              <a:rPr lang="es-ES" dirty="0" smtClean="0"/>
+              <a:t> Linux</a:t>
+            </a:r>
+            <a:endParaRPr lang="es-ES" dirty="0"/>
           </a:p>
         </p:txBody>
       </p:sp>
@@ -9168,7 +9615,7 @@
     </p:spTree>
     <p:extLst>
       <p:ext uri="{BB962C8B-B14F-4D97-AF65-F5344CB8AC3E}">
-        <p14:creationId xmlns:p14="http://schemas.microsoft.com/office/powerpoint/2010/main" val="2015990969"/>
+        <p14:creationId xmlns:p14="http://schemas.microsoft.com/office/powerpoint/2010/main" val="3895191232"/>
       </p:ext>
     </p:extLst>
   </p:cSld>
@@ -9218,56 +9665,72 @@
           <a:lstStyle/>
           <a:p>
             <a:r>
+              <a:rPr lang="en-US" dirty="0" smtClean="0"/>
+              <a:t>3.1.  Translation</a:t>
+            </a:r>
+            <a:r>
               <a:rPr lang="es-ES" dirty="0" smtClean="0"/>
-              <a:t>4.  Performance </a:t>
+              <a:t> </a:t>
+            </a:r>
+            <a:r>
+              <a:rPr lang="en-US" dirty="0" smtClean="0"/>
+              <a:t>process II</a:t>
+            </a:r>
+            <a:endParaRPr lang="en-US" dirty="0"/>
+          </a:p>
+        </p:txBody>
+      </p:sp>
+      <p:sp>
+        <p:nvSpPr>
+          <p:cNvPr id="3" name="Marcador de contenido 2"/>
+          <p:cNvSpPr>
+            <a:spLocks noGrp="1"/>
+          </p:cNvSpPr>
+          <p:nvPr>
+            <p:ph idx="1"/>
+          </p:nvPr>
+        </p:nvSpPr>
+        <p:spPr/>
+        <p:txBody>
+          <a:bodyPr/>
+          <a:lstStyle/>
+          <a:p>
+            <a:endParaRPr lang="en-US" dirty="0"/>
+          </a:p>
+        </p:txBody>
+      </p:sp>
+      <p:sp>
+        <p:nvSpPr>
+          <p:cNvPr id="4" name="Marcador de pie de página 3"/>
+          <p:cNvSpPr>
+            <a:spLocks noGrp="1"/>
+          </p:cNvSpPr>
+          <p:nvPr>
+            <p:ph type="ftr" sz="quarter" idx="11"/>
+          </p:nvPr>
+        </p:nvSpPr>
+        <p:spPr/>
+        <p:txBody>
+          <a:bodyPr/>
+          <a:lstStyle/>
+          <a:p>
+            <a:r>
+              <a:rPr lang="es-ES" dirty="0" err="1" smtClean="0"/>
+              <a:t>IOSharp</a:t>
             </a:r>
             <a:r>
               <a:rPr lang="es-ES" dirty="0" smtClean="0"/>
-              <a:t>Test</a:t>
-            </a:r>
-            <a:endParaRPr lang="en-US" dirty="0"/>
-          </a:p>
-        </p:txBody>
-      </p:sp>
-      <p:sp>
-        <p:nvSpPr>
-          <p:cNvPr id="3" name="Marcador de contenido 2"/>
-          <p:cNvSpPr>
-            <a:spLocks noGrp="1"/>
-          </p:cNvSpPr>
-          <p:nvPr>
-            <p:ph idx="1"/>
-          </p:nvPr>
-        </p:nvSpPr>
-        <p:spPr/>
-        <p:txBody>
-          <a:bodyPr/>
-          <a:lstStyle/>
-          <a:p>
-            <a:endParaRPr lang="en-US"/>
-          </a:p>
-        </p:txBody>
-      </p:sp>
-      <p:sp>
-        <p:nvSpPr>
-          <p:cNvPr id="4" name="Marcador de pie de página 3"/>
-          <p:cNvSpPr>
-            <a:spLocks noGrp="1"/>
-          </p:cNvSpPr>
-          <p:nvPr>
-            <p:ph type="ftr" sz="quarter" idx="11"/>
-          </p:nvPr>
-        </p:nvSpPr>
-        <p:spPr/>
-        <p:txBody>
-          <a:bodyPr/>
-          <a:lstStyle/>
-          <a:p>
-            <a:r>
-              <a:rPr lang="es-ES" smtClean="0"/>
-              <a:t>IOSharp: .NET Micro Framework on Linux</a:t>
-            </a:r>
-            <a:endParaRPr lang="es-ES"/>
+              <a:t>: .NET Micro Framework </a:t>
+            </a:r>
+            <a:r>
+              <a:rPr lang="es-ES" dirty="0" err="1" smtClean="0"/>
+              <a:t>on</a:t>
+            </a:r>
+            <a:r>
+              <a:rPr lang="es-ES" dirty="0" smtClean="0"/>
+              <a:t> Linux</a:t>
+            </a:r>
+            <a:endParaRPr lang="es-ES" dirty="0"/>
           </a:p>
         </p:txBody>
       </p:sp>
@@ -9297,7 +9760,7 @@
     </p:spTree>
     <p:extLst>
       <p:ext uri="{BB962C8B-B14F-4D97-AF65-F5344CB8AC3E}">
-        <p14:creationId xmlns:p14="http://schemas.microsoft.com/office/powerpoint/2010/main" val="204124017"/>
+        <p14:creationId xmlns:p14="http://schemas.microsoft.com/office/powerpoint/2010/main" val="24582"/>
       </p:ext>
     </p:extLst>
   </p:cSld>
@@ -9348,7 +9811,11 @@
           <a:p>
             <a:r>
               <a:rPr lang="en-US" dirty="0" smtClean="0"/>
-              <a:t>4.1.  Example</a:t>
+              <a:t>3.2.  Translated </a:t>
+            </a:r>
+            <a:r>
+              <a:rPr lang="en-US" dirty="0" err="1" smtClean="0"/>
+              <a:t>IOSharp</a:t>
             </a:r>
             <a:endParaRPr lang="en-US" dirty="0"/>
           </a:p>
@@ -9364,35 +9831,40 @@
             <p:ph idx="1"/>
           </p:nvPr>
         </p:nvSpPr>
+        <p:spPr>
+          <a:xfrm>
+            <a:off x="1942415" y="2133600"/>
+            <a:ext cx="6591985" cy="1655440"/>
+          </a:xfrm>
+        </p:spPr>
+        <p:txBody>
+          <a:bodyPr/>
+          <a:lstStyle/>
+          <a:p>
+            <a:endParaRPr lang="en-US" dirty="0"/>
+          </a:p>
+        </p:txBody>
+      </p:sp>
+      <p:sp>
+        <p:nvSpPr>
+          <p:cNvPr id="4" name="Marcador de pie de página 3"/>
+          <p:cNvSpPr>
+            <a:spLocks noGrp="1"/>
+          </p:cNvSpPr>
+          <p:nvPr>
+            <p:ph type="ftr" sz="quarter" idx="11"/>
+          </p:nvPr>
+        </p:nvSpPr>
         <p:spPr/>
         <p:txBody>
           <a:bodyPr/>
           <a:lstStyle/>
           <a:p>
-            <a:endParaRPr lang="en-US"/>
-          </a:p>
-        </p:txBody>
-      </p:sp>
-      <p:sp>
-        <p:nvSpPr>
-          <p:cNvPr id="4" name="Marcador de pie de página 3"/>
-          <p:cNvSpPr>
-            <a:spLocks noGrp="1"/>
-          </p:cNvSpPr>
-          <p:nvPr>
-            <p:ph type="ftr" sz="quarter" idx="11"/>
-          </p:nvPr>
-        </p:nvSpPr>
-        <p:spPr/>
-        <p:txBody>
-          <a:bodyPr/>
-          <a:lstStyle/>
-          <a:p>
             <a:r>
               <a:rPr lang="es-ES" smtClean="0"/>
               <a:t>IOSharp: .NET Micro Framework on Linux</a:t>
             </a:r>
-            <a:endParaRPr lang="es-ES"/>
+            <a:endParaRPr lang="es-ES" dirty="0"/>
           </a:p>
         </p:txBody>
       </p:sp>
@@ -9419,23 +9891,73 @@
           </a:p>
         </p:txBody>
       </p:sp>
+      <p:graphicFrame>
+        <p:nvGraphicFramePr>
+          <p:cNvPr id="6" name="Objeto 5"/>
+          <p:cNvGraphicFramePr>
+            <a:graphicFrameLocks noChangeAspect="1"/>
+          </p:cNvGraphicFramePr>
+          <p:nvPr>
+            <p:extLst>
+              <p:ext uri="{D42A27DB-BD31-4B8C-83A1-F6EECF244321}">
+                <p14:modId xmlns:p14="http://schemas.microsoft.com/office/powerpoint/2010/main" val="2119895384"/>
+              </p:ext>
+            </p:extLst>
+          </p:nvPr>
+        </p:nvGraphicFramePr>
+        <p:xfrm>
+          <a:off x="2195736" y="4017640"/>
+          <a:ext cx="6096000" cy="1724025"/>
+        </p:xfrm>
+        <a:graphic>
+          <a:graphicData uri="http://schemas.openxmlformats.org/presentationml/2006/ole">
+            <mc:AlternateContent xmlns:mc="http://schemas.openxmlformats.org/markup-compatibility/2006">
+              <mc:Choice xmlns:v="urn:schemas-microsoft-com:vml" Requires="v">
+                <p:oleObj spid="_x0000_s5137" name="Visio" r:id="rId3" imgW="9696510" imgH="2743200" progId="Visio.Drawing.15">
+                  <p:embed/>
+                </p:oleObj>
+              </mc:Choice>
+              <mc:Fallback>
+                <p:oleObj name="Visio" r:id="rId3" imgW="9696510" imgH="2743200" progId="Visio.Drawing.15">
+                  <p:embed/>
+                  <p:pic>
+                    <p:nvPicPr>
+                      <p:cNvPr id="0" name=""/>
+                      <p:cNvPicPr/>
+                      <p:nvPr/>
+                    </p:nvPicPr>
+                    <p:blipFill>
+                      <a:blip r:embed="rId4"/>
+                      <a:stretch>
+                        <a:fillRect/>
+                      </a:stretch>
+                    </p:blipFill>
+                    <p:spPr>
+                      <a:xfrm>
+                        <a:off x="2195736" y="4017640"/>
+                        <a:ext cx="6096000" cy="1724025"/>
+                      </a:xfrm>
+                      <a:prstGeom prst="rect">
+                        <a:avLst/>
+                      </a:prstGeom>
+                    </p:spPr>
+                  </p:pic>
+                </p:oleObj>
+              </mc:Fallback>
+            </mc:AlternateContent>
+          </a:graphicData>
+        </a:graphic>
+      </p:graphicFrame>
     </p:spTree>
     <p:extLst>
       <p:ext uri="{BB962C8B-B14F-4D97-AF65-F5344CB8AC3E}">
-        <p14:creationId xmlns:p14="http://schemas.microsoft.com/office/powerpoint/2010/main" val="4154510114"/>
+        <p14:creationId xmlns:p14="http://schemas.microsoft.com/office/powerpoint/2010/main" val="702860768"/>
       </p:ext>
     </p:extLst>
   </p:cSld>
   <p:clrMapOvr>
     <a:masterClrMapping/>
   </p:clrMapOvr>
-  <p:timing>
-    <p:tnLst>
-      <p:par>
-        <p:cTn id="1" dur="indefinite" restart="never" nodeType="tmRoot"/>
-      </p:par>
-    </p:tnLst>
-  </p:timing>
 </p:sld>
 </file>
 
@@ -9473,7 +9995,11 @@
           <a:p>
             <a:r>
               <a:rPr lang="en-US" dirty="0" smtClean="0"/>
-              <a:t>5.  Conclusions</a:t>
+              <a:t>3.3.  </a:t>
+            </a:r>
+            <a:r>
+              <a:rPr lang="en-US" dirty="0" smtClean="0"/>
+              <a:t>Example</a:t>
             </a:r>
             <a:endParaRPr lang="en-US" dirty="0"/>
           </a:p>
@@ -9494,7 +10020,54 @@
           <a:bodyPr/>
           <a:lstStyle/>
           <a:p>
-            <a:endParaRPr lang="en-US"/>
+            <a:endParaRPr lang="en-US" dirty="0" smtClean="0"/>
+          </a:p>
+          <a:p>
+            <a:endParaRPr lang="en-US" dirty="0"/>
+          </a:p>
+          <a:p>
+            <a:r>
+              <a:rPr lang="en-US" dirty="0" err="1" smtClean="0"/>
+              <a:t>AlterNative</a:t>
+            </a:r>
+            <a:r>
+              <a:rPr lang="en-US" dirty="0" smtClean="0"/>
+              <a:t> with the </a:t>
+            </a:r>
+            <a:r>
+              <a:rPr lang="en-US" dirty="0" err="1" smtClean="0"/>
+              <a:t>ILSpy</a:t>
+            </a:r>
+            <a:r>
+              <a:rPr lang="en-US" dirty="0" smtClean="0"/>
+              <a:t> interface</a:t>
+            </a:r>
+          </a:p>
+          <a:p>
+            <a:endParaRPr lang="en-US" dirty="0"/>
+          </a:p>
+          <a:p>
+            <a:r>
+              <a:rPr lang="en-US" dirty="0" smtClean="0"/>
+              <a:t>Translating the </a:t>
+            </a:r>
+            <a:r>
+              <a:rPr lang="en-US" dirty="0" err="1" smtClean="0"/>
+              <a:t>GPIOManager</a:t>
+            </a:r>
+            <a:r>
+              <a:rPr lang="en-US" dirty="0" smtClean="0"/>
+              <a:t> from </a:t>
+            </a:r>
+            <a:r>
+              <a:rPr lang="en-US" dirty="0" err="1" smtClean="0"/>
+              <a:t>IOSharp</a:t>
+            </a:r>
+            <a:r>
+              <a:rPr lang="en-US" dirty="0" smtClean="0"/>
+              <a:t> library</a:t>
+            </a:r>
+            <a:endParaRPr lang="en-US" dirty="0"/>
           </a:p>
         </p:txBody>
       </p:sp>
@@ -9547,7 +10120,7 @@
     </p:spTree>
     <p:extLst>
       <p:ext uri="{BB962C8B-B14F-4D97-AF65-F5344CB8AC3E}">
-        <p14:creationId xmlns:p14="http://schemas.microsoft.com/office/powerpoint/2010/main" val="3876770985"/>
+        <p14:creationId xmlns:p14="http://schemas.microsoft.com/office/powerpoint/2010/main" val="2015990969"/>
       </p:ext>
     </p:extLst>
   </p:cSld>
@@ -9591,26 +10164,51 @@
             <p:ph type="title"/>
           </p:nvPr>
         </p:nvSpPr>
-        <p:spPr/>
+        <p:spPr>
+          <a:xfrm>
+            <a:off x="1945201" y="624110"/>
+            <a:ext cx="6589199" cy="919069"/>
+          </a:xfrm>
+        </p:spPr>
+        <p:txBody>
+          <a:bodyPr/>
+          <a:lstStyle/>
+          <a:p>
+            <a:r>
+              <a:rPr lang="es-ES" dirty="0" smtClean="0"/>
+              <a:t>4.  Performance Test</a:t>
+            </a:r>
+            <a:endParaRPr lang="en-US" dirty="0"/>
+          </a:p>
+        </p:txBody>
+      </p:sp>
+      <p:sp>
+        <p:nvSpPr>
+          <p:cNvPr id="3" name="Marcador de contenido 2"/>
+          <p:cNvSpPr>
+            <a:spLocks noGrp="1"/>
+          </p:cNvSpPr>
+          <p:nvPr>
+            <p:ph idx="1"/>
+          </p:nvPr>
+        </p:nvSpPr>
+        <p:spPr>
+          <a:xfrm>
+            <a:off x="1942415" y="1700808"/>
+            <a:ext cx="6591985" cy="3777622"/>
+          </a:xfrm>
+        </p:spPr>
         <p:txBody>
           <a:bodyPr/>
           <a:lstStyle/>
           <a:p>
             <a:r>
               <a:rPr lang="en-US" dirty="0" smtClean="0"/>
-              <a:t>6.  Questions</a:t>
-            </a:r>
-            <a:r>
-              <a:rPr lang="es-ES" dirty="0" smtClean="0"/>
-              <a:t> </a:t>
-            </a:r>
-            <a:r>
-              <a:rPr lang="es-ES" dirty="0" smtClean="0"/>
-              <a:t>&amp; </a:t>
-            </a:r>
-            <a:r>
-              <a:rPr lang="en-US" dirty="0" smtClean="0"/>
-              <a:t>Answers</a:t>
+              <a:t>Evaluate the increased performance using </a:t>
+            </a:r>
+            <a:r>
+              <a:rPr lang="en-US" dirty="0" err="1" smtClean="0"/>
+              <a:t>AlterNative</a:t>
             </a:r>
             <a:endParaRPr lang="en-US" dirty="0"/>
           </a:p>
@@ -9662,10 +10260,297 @@
           </a:p>
         </p:txBody>
       </p:sp>
+      <p:pic>
+        <p:nvPicPr>
+          <p:cNvPr id="11" name="Imagen 10"/>
+          <p:cNvPicPr>
+            <a:picLocks noChangeAspect="1"/>
+          </p:cNvPicPr>
+          <p:nvPr/>
+        </p:nvPicPr>
+        <p:blipFill>
+          <a:blip r:embed="rId2"/>
+          <a:stretch>
+            <a:fillRect/>
+          </a:stretch>
+        </p:blipFill>
+        <p:spPr>
+          <a:xfrm>
+            <a:off x="2195736" y="2447932"/>
+            <a:ext cx="4249280" cy="3359187"/>
+          </a:xfrm>
+          <a:prstGeom prst="rect">
+            <a:avLst/>
+          </a:prstGeom>
+        </p:spPr>
+      </p:pic>
     </p:spTree>
     <p:extLst>
       <p:ext uri="{BB962C8B-B14F-4D97-AF65-F5344CB8AC3E}">
-        <p14:creationId xmlns:p14="http://schemas.microsoft.com/office/powerpoint/2010/main" val="1345899272"/>
+        <p14:creationId xmlns:p14="http://schemas.microsoft.com/office/powerpoint/2010/main" val="204124017"/>
+      </p:ext>
+    </p:extLst>
+  </p:cSld>
+  <p:clrMapOvr>
+    <a:masterClrMapping/>
+  </p:clrMapOvr>
+  <p:timing>
+    <p:tnLst>
+      <p:par>
+        <p:cTn id="1" dur="indefinite" restart="never" nodeType="tmRoot"/>
+      </p:par>
+    </p:tnLst>
+  </p:timing>
+</p:sld>
+</file>
+
+<file path=ppt/slides/slide18.xml><?xml version="1.0" encoding="utf-8"?>
+<p:sld xmlns:a="http://schemas.openxmlformats.org/drawingml/2006/main" xmlns:r="http://schemas.openxmlformats.org/officeDocument/2006/relationships" xmlns:p="http://schemas.openxmlformats.org/presentationml/2006/main">
+  <p:cSld>
+    <p:spTree>
+      <p:nvGrpSpPr>
+        <p:cNvPr id="1" name=""/>
+        <p:cNvGrpSpPr/>
+        <p:nvPr/>
+      </p:nvGrpSpPr>
+      <p:grpSpPr>
+        <a:xfrm>
+          <a:off x="0" y="0"/>
+          <a:ext cx="0" cy="0"/>
+          <a:chOff x="0" y="0"/>
+          <a:chExt cx="0" cy="0"/>
+        </a:xfrm>
+      </p:grpSpPr>
+      <p:sp>
+        <p:nvSpPr>
+          <p:cNvPr id="2" name="Título 1"/>
+          <p:cNvSpPr>
+            <a:spLocks noGrp="1"/>
+          </p:cNvSpPr>
+          <p:nvPr>
+            <p:ph type="title"/>
+          </p:nvPr>
+        </p:nvSpPr>
+        <p:spPr/>
+        <p:txBody>
+          <a:bodyPr/>
+          <a:lstStyle/>
+          <a:p>
+            <a:r>
+              <a:rPr lang="en-US" dirty="0" smtClean="0"/>
+              <a:t>4.1.  Example</a:t>
+            </a:r>
+            <a:endParaRPr lang="en-US" dirty="0"/>
+          </a:p>
+        </p:txBody>
+      </p:sp>
+      <p:sp>
+        <p:nvSpPr>
+          <p:cNvPr id="3" name="Marcador de contenido 2"/>
+          <p:cNvSpPr>
+            <a:spLocks noGrp="1"/>
+          </p:cNvSpPr>
+          <p:nvPr>
+            <p:ph idx="1"/>
+          </p:nvPr>
+        </p:nvSpPr>
+        <p:spPr/>
+        <p:txBody>
+          <a:bodyPr/>
+          <a:lstStyle/>
+          <a:p>
+            <a:endParaRPr lang="en-US" dirty="0" smtClean="0"/>
+          </a:p>
+          <a:p>
+            <a:endParaRPr lang="en-US" dirty="0"/>
+          </a:p>
+          <a:p>
+            <a:endParaRPr lang="en-US" dirty="0" smtClean="0"/>
+          </a:p>
+          <a:p>
+            <a:r>
+              <a:rPr lang="en-US" dirty="0" smtClean="0"/>
+              <a:t>Performance test using the10K GPIO iterations</a:t>
+            </a:r>
+            <a:endParaRPr lang="en-US" dirty="0"/>
+          </a:p>
+        </p:txBody>
+      </p:sp>
+      <p:sp>
+        <p:nvSpPr>
+          <p:cNvPr id="4" name="Marcador de pie de página 3"/>
+          <p:cNvSpPr>
+            <a:spLocks noGrp="1"/>
+          </p:cNvSpPr>
+          <p:nvPr>
+            <p:ph type="ftr" sz="quarter" idx="11"/>
+          </p:nvPr>
+        </p:nvSpPr>
+        <p:spPr/>
+        <p:txBody>
+          <a:bodyPr/>
+          <a:lstStyle/>
+          <a:p>
+            <a:r>
+              <a:rPr lang="es-ES" smtClean="0"/>
+              <a:t>IOSharp: .NET Micro Framework on Linux</a:t>
+            </a:r>
+            <a:endParaRPr lang="es-ES"/>
+          </a:p>
+        </p:txBody>
+      </p:sp>
+      <p:sp>
+        <p:nvSpPr>
+          <p:cNvPr id="5" name="Marcador de número de diapositiva 4"/>
+          <p:cNvSpPr>
+            <a:spLocks noGrp="1"/>
+          </p:cNvSpPr>
+          <p:nvPr>
+            <p:ph type="sldNum" sz="quarter" idx="12"/>
+          </p:nvPr>
+        </p:nvSpPr>
+        <p:spPr/>
+        <p:txBody>
+          <a:bodyPr/>
+          <a:lstStyle/>
+          <a:p>
+            <a:fld id="{8EE90C33-BF19-4C36-8633-00054130773A}" type="slidenum">
+              <a:rPr lang="es-ES" smtClean="0"/>
+              <a:t>18</a:t>
+            </a:fld>
+            <a:endParaRPr lang="es-ES"/>
+          </a:p>
+        </p:txBody>
+      </p:sp>
+    </p:spTree>
+    <p:extLst>
+      <p:ext uri="{BB962C8B-B14F-4D97-AF65-F5344CB8AC3E}">
+        <p14:creationId xmlns:p14="http://schemas.microsoft.com/office/powerpoint/2010/main" val="4154510114"/>
+      </p:ext>
+    </p:extLst>
+  </p:cSld>
+  <p:clrMapOvr>
+    <a:masterClrMapping/>
+  </p:clrMapOvr>
+  <p:timing>
+    <p:tnLst>
+      <p:par>
+        <p:cTn id="1" dur="indefinite" restart="never" nodeType="tmRoot"/>
+      </p:par>
+    </p:tnLst>
+  </p:timing>
+</p:sld>
+</file>
+
+<file path=ppt/slides/slide19.xml><?xml version="1.0" encoding="utf-8"?>
+<p:sld xmlns:a="http://schemas.openxmlformats.org/drawingml/2006/main" xmlns:r="http://schemas.openxmlformats.org/officeDocument/2006/relationships" xmlns:p="http://schemas.openxmlformats.org/presentationml/2006/main">
+  <p:cSld>
+    <p:spTree>
+      <p:nvGrpSpPr>
+        <p:cNvPr id="1" name=""/>
+        <p:cNvGrpSpPr/>
+        <p:nvPr/>
+      </p:nvGrpSpPr>
+      <p:grpSpPr>
+        <a:xfrm>
+          <a:off x="0" y="0"/>
+          <a:ext cx="0" cy="0"/>
+          <a:chOff x="0" y="0"/>
+          <a:chExt cx="0" cy="0"/>
+        </a:xfrm>
+      </p:grpSpPr>
+      <p:sp>
+        <p:nvSpPr>
+          <p:cNvPr id="2" name="Título 1"/>
+          <p:cNvSpPr>
+            <a:spLocks noGrp="1"/>
+          </p:cNvSpPr>
+          <p:nvPr>
+            <p:ph type="title"/>
+          </p:nvPr>
+        </p:nvSpPr>
+        <p:spPr/>
+        <p:txBody>
+          <a:bodyPr/>
+          <a:lstStyle/>
+          <a:p>
+            <a:r>
+              <a:rPr lang="en-US" dirty="0" smtClean="0"/>
+              <a:t>5.  Conclusions</a:t>
+            </a:r>
+            <a:endParaRPr lang="en-US" dirty="0"/>
+          </a:p>
+        </p:txBody>
+      </p:sp>
+      <p:sp>
+        <p:nvSpPr>
+          <p:cNvPr id="3" name="Marcador de contenido 2"/>
+          <p:cNvSpPr>
+            <a:spLocks noGrp="1"/>
+          </p:cNvSpPr>
+          <p:nvPr>
+            <p:ph idx="1"/>
+          </p:nvPr>
+        </p:nvSpPr>
+        <p:spPr/>
+        <p:txBody>
+          <a:bodyPr/>
+          <a:lstStyle/>
+          <a:p>
+            <a:endParaRPr lang="en-US" dirty="0"/>
+          </a:p>
+        </p:txBody>
+      </p:sp>
+      <p:sp>
+        <p:nvSpPr>
+          <p:cNvPr id="4" name="Marcador de pie de página 3"/>
+          <p:cNvSpPr>
+            <a:spLocks noGrp="1"/>
+          </p:cNvSpPr>
+          <p:nvPr>
+            <p:ph type="ftr" sz="quarter" idx="11"/>
+          </p:nvPr>
+        </p:nvSpPr>
+        <p:spPr/>
+        <p:txBody>
+          <a:bodyPr/>
+          <a:lstStyle/>
+          <a:p>
+            <a:r>
+              <a:rPr lang="es-ES" smtClean="0"/>
+              <a:t>IOSharp: .NET Micro Framework on Linux</a:t>
+            </a:r>
+            <a:endParaRPr lang="es-ES"/>
+          </a:p>
+        </p:txBody>
+      </p:sp>
+      <p:sp>
+        <p:nvSpPr>
+          <p:cNvPr id="5" name="Marcador de número de diapositiva 4"/>
+          <p:cNvSpPr>
+            <a:spLocks noGrp="1"/>
+          </p:cNvSpPr>
+          <p:nvPr>
+            <p:ph type="sldNum" sz="quarter" idx="12"/>
+          </p:nvPr>
+        </p:nvSpPr>
+        <p:spPr/>
+        <p:txBody>
+          <a:bodyPr/>
+          <a:lstStyle/>
+          <a:p>
+            <a:fld id="{8EE90C33-BF19-4C36-8633-00054130773A}" type="slidenum">
+              <a:rPr lang="es-ES" smtClean="0"/>
+              <a:t>19</a:t>
+            </a:fld>
+            <a:endParaRPr lang="es-ES"/>
+          </a:p>
+        </p:txBody>
+      </p:sp>
+    </p:spTree>
+    <p:extLst>
+      <p:ext uri="{BB962C8B-B14F-4D97-AF65-F5344CB8AC3E}">
+        <p14:creationId xmlns:p14="http://schemas.microsoft.com/office/powerpoint/2010/main" val="3876770985"/>
       </p:ext>
     </p:extLst>
   </p:cSld>
@@ -9747,162 +10632,130 @@
         </p:spPr>
         <p:txBody>
           <a:bodyPr>
-            <a:normAutofit fontScale="92500" lnSpcReduction="20000"/>
+            <a:normAutofit fontScale="77500" lnSpcReduction="20000"/>
           </a:bodyPr>
           <a:lstStyle/>
           <a:p>
             <a:r>
-              <a:rPr lang="en-US" noProof="1"/>
-              <a:t>1</a:t>
-            </a:r>
-            <a:r>
-              <a:rPr lang="en-US" noProof="1"/>
-              <a:t>.  </a:t>
-            </a:r>
-            <a:r>
               <a:rPr lang="en-US" noProof="1" smtClean="0"/>
-              <a:t>Introduction</a:t>
+              <a:t>1.  Introduction</a:t>
             </a:r>
           </a:p>
           <a:p>
             <a:pPr lvl="1"/>
             <a:r>
-              <a:rPr lang="es-ES" dirty="0" smtClean="0"/>
+              <a:rPr lang="en-US" dirty="0" smtClean="0"/>
               <a:t>1.1.  .NET Micro Framework</a:t>
             </a:r>
-            <a:endParaRPr lang="en-US" dirty="0"/>
-          </a:p>
-          <a:p>
-            <a:r>
-              <a:rPr lang="es-ES" dirty="0"/>
+          </a:p>
+          <a:p>
+            <a:r>
+              <a:rPr lang="en-US" dirty="0" smtClean="0"/>
               <a:t>2.  </a:t>
             </a:r>
             <a:r>
-              <a:rPr lang="es-ES" dirty="0" err="1" smtClean="0"/>
+              <a:rPr lang="en-US" dirty="0" err="1" smtClean="0"/>
               <a:t>IOSharp</a:t>
             </a:r>
-            <a:endParaRPr lang="es-ES" dirty="0" smtClean="0"/>
+            <a:endParaRPr lang="en-US" dirty="0" smtClean="0"/>
           </a:p>
           <a:p>
             <a:pPr lvl="1"/>
             <a:r>
-              <a:rPr lang="es-ES" dirty="0"/>
-              <a:t>2.1.  </a:t>
-            </a:r>
-            <a:r>
-              <a:rPr lang="es-ES" dirty="0" smtClean="0"/>
-              <a:t>GPIO</a:t>
+              <a:rPr lang="en-US" dirty="0" smtClean="0"/>
+              <a:t>2.1.  GPIO</a:t>
             </a:r>
           </a:p>
           <a:p>
             <a:pPr lvl="1"/>
             <a:r>
-              <a:rPr lang="es-ES" dirty="0" smtClean="0"/>
-              <a:t>2.2.  </a:t>
-            </a:r>
-            <a:r>
-              <a:rPr lang="es-ES" dirty="0" err="1" smtClean="0"/>
-              <a:t>Interrupts</a:t>
-            </a:r>
-            <a:endParaRPr lang="es-ES" dirty="0" smtClean="0"/>
+              <a:rPr lang="en-US" dirty="0" smtClean="0"/>
+              <a:t>2.2.  Interrupts</a:t>
+            </a:r>
           </a:p>
           <a:p>
             <a:pPr lvl="1"/>
             <a:r>
-              <a:rPr lang="es-ES" dirty="0" smtClean="0"/>
+              <a:rPr lang="en-US" dirty="0" smtClean="0"/>
               <a:t>2.3.  SPI</a:t>
             </a:r>
           </a:p>
           <a:p>
             <a:pPr lvl="1"/>
             <a:r>
-              <a:rPr lang="es-ES" dirty="0" smtClean="0"/>
+              <a:rPr lang="en-US" dirty="0" smtClean="0"/>
               <a:t>2.4.  UART</a:t>
             </a:r>
           </a:p>
           <a:p>
-            <a:r>
-              <a:rPr lang="es-ES" dirty="0"/>
+            <a:pPr lvl="1"/>
+            <a:r>
+              <a:rPr lang="en-US" dirty="0" smtClean="0"/>
+              <a:t>2.5.  Example</a:t>
+            </a:r>
+            <a:endParaRPr lang="en-US" dirty="0" smtClean="0"/>
+          </a:p>
+          <a:p>
+            <a:r>
+              <a:rPr lang="en-US" dirty="0" smtClean="0"/>
               <a:t>3.  </a:t>
             </a:r>
             <a:r>
-              <a:rPr lang="es-ES" dirty="0" err="1" smtClean="0"/>
+              <a:rPr lang="en-US" dirty="0" err="1" smtClean="0"/>
               <a:t>AlterNative</a:t>
             </a:r>
-            <a:endParaRPr lang="es-ES" dirty="0" smtClean="0"/>
+            <a:endParaRPr lang="en-US" dirty="0" smtClean="0"/>
           </a:p>
           <a:p>
             <a:pPr lvl="1"/>
             <a:r>
+              <a:rPr lang="en-US" dirty="0" smtClean="0"/>
+              <a:t>3.1.  Translation process</a:t>
+            </a:r>
+          </a:p>
+          <a:p>
+            <a:pPr lvl="1"/>
+            <a:r>
               <a:rPr lang="en-US" dirty="0"/>
-              <a:t>3.1.  Translation</a:t>
-            </a:r>
-            <a:r>
-              <a:rPr lang="es-ES" dirty="0"/>
-              <a:t> </a:t>
-            </a:r>
+              <a:t>3.2.  Translated </a:t>
+            </a:r>
+            <a:r>
+              <a:rPr lang="en-US" dirty="0" err="1"/>
+              <a:t>IOSharp</a:t>
+            </a:r>
+            <a:endParaRPr lang="en-US" dirty="0" smtClean="0"/>
+          </a:p>
+          <a:p>
+            <a:pPr lvl="1"/>
             <a:r>
               <a:rPr lang="en-US" dirty="0" smtClean="0"/>
-              <a:t>process</a:t>
+              <a:t>3.3.  Example</a:t>
+            </a:r>
+          </a:p>
+          <a:p>
+            <a:r>
+              <a:rPr lang="en-US" dirty="0" smtClean="0"/>
+              <a:t>4.  Performance Test</a:t>
             </a:r>
           </a:p>
           <a:p>
             <a:pPr lvl="1"/>
             <a:r>
-              <a:rPr lang="en-US" dirty="0"/>
-              <a:t>3.2.  </a:t>
-            </a:r>
-            <a:r>
               <a:rPr lang="en-US" dirty="0" smtClean="0"/>
-              <a:t>Example</a:t>
-            </a:r>
-          </a:p>
-          <a:p>
-            <a:r>
-              <a:rPr lang="es-ES" dirty="0"/>
-              <a:t>4.  Performance </a:t>
-            </a:r>
-            <a:r>
-              <a:rPr lang="es-ES" dirty="0" smtClean="0"/>
-              <a:t>Test</a:t>
-            </a:r>
-          </a:p>
-          <a:p>
-            <a:pPr lvl="1"/>
-            <a:r>
-              <a:rPr lang="es-ES" dirty="0" smtClean="0"/>
-              <a:t>4.1.  </a:t>
-            </a:r>
-            <a:r>
-              <a:rPr lang="es-ES" dirty="0" err="1" smtClean="0"/>
-              <a:t>Example</a:t>
-            </a:r>
-            <a:endParaRPr lang="es-ES" dirty="0" smtClean="0"/>
-          </a:p>
-          <a:p>
-            <a:r>
-              <a:rPr lang="en-US" dirty="0"/>
-              <a:t>5.  </a:t>
-            </a:r>
+              <a:t>4.1.  Example</a:t>
+            </a:r>
+          </a:p>
+          <a:p>
             <a:r>
               <a:rPr lang="en-US" dirty="0" smtClean="0"/>
-              <a:t>Conclusions</a:t>
-            </a:r>
-          </a:p>
-          <a:p>
-            <a:r>
-              <a:rPr lang="en-US" dirty="0"/>
-              <a:t>6.  Questions</a:t>
-            </a:r>
-            <a:r>
-              <a:rPr lang="es-ES" dirty="0"/>
-              <a:t> &amp; </a:t>
-            </a:r>
-            <a:r>
-              <a:rPr lang="en-US" dirty="0"/>
-              <a:t>Answers</a:t>
-            </a:r>
-            <a:endParaRPr lang="en-US" dirty="0" smtClean="0"/>
+              <a:t>5.  Conclusions</a:t>
+            </a:r>
+          </a:p>
+          <a:p>
+            <a:r>
+              <a:rPr lang="en-US" dirty="0" smtClean="0"/>
+              <a:t>6.  Questions &amp; Answers</a:t>
+            </a:r>
           </a:p>
           <a:p>
             <a:endParaRPr lang="es-ES" dirty="0" smtClean="0"/>
@@ -9966,6 +10819,249 @@
     <p:extLst>
       <p:ext uri="{BB962C8B-B14F-4D97-AF65-F5344CB8AC3E}">
         <p14:creationId xmlns:p14="http://schemas.microsoft.com/office/powerpoint/2010/main" val="1296244924"/>
+      </p:ext>
+    </p:extLst>
+  </p:cSld>
+  <p:clrMapOvr>
+    <a:masterClrMapping/>
+  </p:clrMapOvr>
+  <p:timing>
+    <p:tnLst>
+      <p:par>
+        <p:cTn id="1" dur="indefinite" restart="never" nodeType="tmRoot"/>
+      </p:par>
+    </p:tnLst>
+  </p:timing>
+</p:sld>
+</file>
+
+<file path=ppt/slides/slide20.xml><?xml version="1.0" encoding="utf-8"?>
+<p:sld xmlns:a="http://schemas.openxmlformats.org/drawingml/2006/main" xmlns:r="http://schemas.openxmlformats.org/officeDocument/2006/relationships" xmlns:p="http://schemas.openxmlformats.org/presentationml/2006/main">
+  <p:cSld>
+    <p:spTree>
+      <p:nvGrpSpPr>
+        <p:cNvPr id="1" name=""/>
+        <p:cNvGrpSpPr/>
+        <p:nvPr/>
+      </p:nvGrpSpPr>
+      <p:grpSpPr>
+        <a:xfrm>
+          <a:off x="0" y="0"/>
+          <a:ext cx="0" cy="0"/>
+          <a:chOff x="0" y="0"/>
+          <a:chExt cx="0" cy="0"/>
+        </a:xfrm>
+      </p:grpSpPr>
+      <p:sp>
+        <p:nvSpPr>
+          <p:cNvPr id="2" name="Título 1"/>
+          <p:cNvSpPr>
+            <a:spLocks noGrp="1"/>
+          </p:cNvSpPr>
+          <p:nvPr>
+            <p:ph type="title"/>
+          </p:nvPr>
+        </p:nvSpPr>
+        <p:spPr/>
+        <p:txBody>
+          <a:bodyPr/>
+          <a:lstStyle/>
+          <a:p>
+            <a:r>
+              <a:rPr lang="en-US" dirty="0" smtClean="0"/>
+              <a:t>5.  </a:t>
+            </a:r>
+            <a:r>
+              <a:rPr lang="en-US" dirty="0" smtClean="0"/>
+              <a:t>Conclusions II</a:t>
+            </a:r>
+            <a:endParaRPr lang="en-US" dirty="0"/>
+          </a:p>
+        </p:txBody>
+      </p:sp>
+      <p:sp>
+        <p:nvSpPr>
+          <p:cNvPr id="3" name="Marcador de contenido 2"/>
+          <p:cNvSpPr>
+            <a:spLocks noGrp="1"/>
+          </p:cNvSpPr>
+          <p:nvPr>
+            <p:ph idx="1"/>
+          </p:nvPr>
+        </p:nvSpPr>
+        <p:spPr/>
+        <p:txBody>
+          <a:bodyPr/>
+          <a:lstStyle/>
+          <a:p>
+            <a:endParaRPr lang="en-US" dirty="0"/>
+          </a:p>
+        </p:txBody>
+      </p:sp>
+      <p:sp>
+        <p:nvSpPr>
+          <p:cNvPr id="4" name="Marcador de pie de página 3"/>
+          <p:cNvSpPr>
+            <a:spLocks noGrp="1"/>
+          </p:cNvSpPr>
+          <p:nvPr>
+            <p:ph type="ftr" sz="quarter" idx="11"/>
+          </p:nvPr>
+        </p:nvSpPr>
+        <p:spPr/>
+        <p:txBody>
+          <a:bodyPr/>
+          <a:lstStyle/>
+          <a:p>
+            <a:r>
+              <a:rPr lang="es-ES" smtClean="0"/>
+              <a:t>IOSharp: .NET Micro Framework on Linux</a:t>
+            </a:r>
+            <a:endParaRPr lang="es-ES"/>
+          </a:p>
+        </p:txBody>
+      </p:sp>
+      <p:sp>
+        <p:nvSpPr>
+          <p:cNvPr id="5" name="Marcador de número de diapositiva 4"/>
+          <p:cNvSpPr>
+            <a:spLocks noGrp="1"/>
+          </p:cNvSpPr>
+          <p:nvPr>
+            <p:ph type="sldNum" sz="quarter" idx="12"/>
+          </p:nvPr>
+        </p:nvSpPr>
+        <p:spPr/>
+        <p:txBody>
+          <a:bodyPr/>
+          <a:lstStyle/>
+          <a:p>
+            <a:fld id="{8EE90C33-BF19-4C36-8633-00054130773A}" type="slidenum">
+              <a:rPr lang="es-ES" smtClean="0"/>
+              <a:t>20</a:t>
+            </a:fld>
+            <a:endParaRPr lang="es-ES"/>
+          </a:p>
+        </p:txBody>
+      </p:sp>
+    </p:spTree>
+    <p:extLst>
+      <p:ext uri="{BB962C8B-B14F-4D97-AF65-F5344CB8AC3E}">
+        <p14:creationId xmlns:p14="http://schemas.microsoft.com/office/powerpoint/2010/main" val="3976270818"/>
+      </p:ext>
+    </p:extLst>
+  </p:cSld>
+  <p:clrMapOvr>
+    <a:masterClrMapping/>
+  </p:clrMapOvr>
+  <p:timing>
+    <p:tnLst>
+      <p:par>
+        <p:cTn id="1" dur="indefinite" restart="never" nodeType="tmRoot"/>
+      </p:par>
+    </p:tnLst>
+  </p:timing>
+</p:sld>
+</file>
+
+<file path=ppt/slides/slide21.xml><?xml version="1.0" encoding="utf-8"?>
+<p:sld xmlns:a="http://schemas.openxmlformats.org/drawingml/2006/main" xmlns:r="http://schemas.openxmlformats.org/officeDocument/2006/relationships" xmlns:p="http://schemas.openxmlformats.org/presentationml/2006/main">
+  <p:cSld>
+    <p:spTree>
+      <p:nvGrpSpPr>
+        <p:cNvPr id="1" name=""/>
+        <p:cNvGrpSpPr/>
+        <p:nvPr/>
+      </p:nvGrpSpPr>
+      <p:grpSpPr>
+        <a:xfrm>
+          <a:off x="0" y="0"/>
+          <a:ext cx="0" cy="0"/>
+          <a:chOff x="0" y="0"/>
+          <a:chExt cx="0" cy="0"/>
+        </a:xfrm>
+      </p:grpSpPr>
+      <p:sp>
+        <p:nvSpPr>
+          <p:cNvPr id="2" name="Título 1"/>
+          <p:cNvSpPr>
+            <a:spLocks noGrp="1"/>
+          </p:cNvSpPr>
+          <p:nvPr>
+            <p:ph type="title"/>
+          </p:nvPr>
+        </p:nvSpPr>
+        <p:spPr/>
+        <p:txBody>
+          <a:bodyPr/>
+          <a:lstStyle/>
+          <a:p>
+            <a:r>
+              <a:rPr lang="en-US" dirty="0" smtClean="0"/>
+              <a:t>6.  Questions</a:t>
+            </a:r>
+            <a:r>
+              <a:rPr lang="es-ES" dirty="0" smtClean="0"/>
+              <a:t> &amp; </a:t>
+            </a:r>
+            <a:r>
+              <a:rPr lang="en-US" dirty="0" smtClean="0"/>
+              <a:t>Answers</a:t>
+            </a:r>
+            <a:endParaRPr lang="en-US" dirty="0"/>
+          </a:p>
+        </p:txBody>
+      </p:sp>
+      <p:sp>
+        <p:nvSpPr>
+          <p:cNvPr id="4" name="Marcador de pie de página 3"/>
+          <p:cNvSpPr>
+            <a:spLocks noGrp="1"/>
+          </p:cNvSpPr>
+          <p:nvPr>
+            <p:ph type="ftr" sz="quarter" idx="11"/>
+          </p:nvPr>
+        </p:nvSpPr>
+        <p:spPr/>
+        <p:txBody>
+          <a:bodyPr/>
+          <a:lstStyle/>
+          <a:p>
+            <a:r>
+              <a:rPr lang="es-ES" smtClean="0"/>
+              <a:t>IOSharp: .NET Micro Framework on Linux</a:t>
+            </a:r>
+            <a:endParaRPr lang="es-ES"/>
+          </a:p>
+        </p:txBody>
+      </p:sp>
+      <p:sp>
+        <p:nvSpPr>
+          <p:cNvPr id="5" name="Marcador de número de diapositiva 4"/>
+          <p:cNvSpPr>
+            <a:spLocks noGrp="1"/>
+          </p:cNvSpPr>
+          <p:nvPr>
+            <p:ph type="sldNum" sz="quarter" idx="12"/>
+          </p:nvPr>
+        </p:nvSpPr>
+        <p:spPr/>
+        <p:txBody>
+          <a:bodyPr/>
+          <a:lstStyle/>
+          <a:p>
+            <a:fld id="{8EE90C33-BF19-4C36-8633-00054130773A}" type="slidenum">
+              <a:rPr lang="es-ES" smtClean="0"/>
+              <a:t>21</a:t>
+            </a:fld>
+            <a:endParaRPr lang="es-ES"/>
+          </a:p>
+        </p:txBody>
+      </p:sp>
+    </p:spTree>
+    <p:extLst>
+      <p:ext uri="{BB962C8B-B14F-4D97-AF65-F5344CB8AC3E}">
+        <p14:creationId xmlns:p14="http://schemas.microsoft.com/office/powerpoint/2010/main" val="1345899272"/>
       </p:ext>
     </p:extLst>
   </p:cSld>
@@ -10195,19 +11291,7 @@
           <a:p>
             <a:r>
               <a:rPr lang="es-ES" dirty="0" smtClean="0"/>
-              <a:t>1.1.  </a:t>
-            </a:r>
-            <a:r>
-              <a:rPr lang="es-ES" dirty="0" smtClean="0"/>
-              <a:t>.NET </a:t>
-            </a:r>
-            <a:r>
-              <a:rPr lang="es-ES" dirty="0" smtClean="0"/>
-              <a:t>Micro </a:t>
-            </a:r>
-            <a:r>
-              <a:rPr lang="es-ES" dirty="0" smtClean="0"/>
-              <a:t>Framework</a:t>
+              <a:t>1.1.  .NET Micro Framework</a:t>
             </a:r>
             <a:endParaRPr lang="en-US" dirty="0"/>
           </a:p>
@@ -10725,7 +11809,7 @@
           <a:graphicData uri="http://schemas.openxmlformats.org/presentationml/2006/ole">
             <mc:AlternateContent xmlns:mc="http://schemas.openxmlformats.org/markup-compatibility/2006">
               <mc:Choice xmlns:v="urn:schemas-microsoft-com:vml" Requires="v">
-                <p:oleObj spid="_x0000_s2056" name="Visio" r:id="rId3" imgW="5067360" imgH="3305265" progId="Visio.Drawing.15">
+                <p:oleObj spid="_x0000_s2105" name="Visio" r:id="rId3" imgW="5067360" imgH="3305265" progId="Visio.Drawing.15">
                   <p:embed/>
                 </p:oleObj>
               </mc:Choice>
@@ -10837,13 +11921,21 @@
           </a:xfrm>
         </p:spPr>
         <p:txBody>
-          <a:bodyPr/>
-          <a:lstStyle/>
+          <a:bodyPr>
+            <a:normAutofit/>
+          </a:bodyPr>
+          <a:lstStyle/>
+          <a:p>
+            <a:endParaRPr lang="en-US" dirty="0" smtClean="0"/>
+          </a:p>
           <a:p>
             <a:r>
               <a:rPr lang="en-US" dirty="0" smtClean="0"/>
-              <a:t>I/O Ports are controlled through the file system</a:t>
-            </a:r>
+              <a:t>I/O Ports are controlled and enabled or disabled through the file system</a:t>
+            </a:r>
+          </a:p>
+          <a:p>
+            <a:endParaRPr lang="en-US" dirty="0" smtClean="0"/>
           </a:p>
           <a:p>
             <a:pPr lvl="1"/>
@@ -10884,6 +11976,41 @@
           </a:p>
           <a:p>
             <a:pPr lvl="1"/>
+            <a:endParaRPr lang="en-US" dirty="0" smtClean="0">
+              <a:latin typeface="Consolas" panose="020B0609020204030204" pitchFamily="49" charset="0"/>
+              <a:cs typeface="Consolas" panose="020B0609020204030204" pitchFamily="49" charset="0"/>
+              <a:sym typeface="Wingdings" panose="05000000000000000000" pitchFamily="2" charset="2"/>
+            </a:endParaRPr>
+          </a:p>
+          <a:p>
+            <a:pPr lvl="1"/>
+            <a:r>
+              <a:rPr lang="en-US" dirty="0" smtClean="0">
+                <a:latin typeface="Consolas" panose="020B0609020204030204" pitchFamily="49" charset="0"/>
+                <a:cs typeface="Consolas" panose="020B0609020204030204" pitchFamily="49" charset="0"/>
+                <a:sym typeface="Wingdings" panose="05000000000000000000" pitchFamily="2" charset="2"/>
+              </a:rPr>
+              <a:t>Direction</a:t>
+            </a:r>
+          </a:p>
+          <a:p>
+            <a:pPr lvl="1"/>
+            <a:endParaRPr lang="en-US" dirty="0" smtClean="0">
+              <a:latin typeface="Consolas" panose="020B0609020204030204" pitchFamily="49" charset="0"/>
+              <a:cs typeface="Consolas" panose="020B0609020204030204" pitchFamily="49" charset="0"/>
+              <a:sym typeface="Wingdings" panose="05000000000000000000" pitchFamily="2" charset="2"/>
+            </a:endParaRPr>
+          </a:p>
+          <a:p>
+            <a:pPr lvl="1"/>
+            <a:r>
+              <a:rPr lang="en-US" dirty="0" smtClean="0">
+                <a:latin typeface="Consolas" panose="020B0609020204030204" pitchFamily="49" charset="0"/>
+                <a:cs typeface="Consolas" panose="020B0609020204030204" pitchFamily="49" charset="0"/>
+                <a:sym typeface="Wingdings" panose="05000000000000000000" pitchFamily="2" charset="2"/>
+              </a:rPr>
+              <a:t>State</a:t>
+            </a:r>
             <a:endParaRPr lang="en-US" dirty="0">
               <a:latin typeface="Consolas" panose="020B0609020204030204" pitchFamily="49" charset="0"/>
               <a:cs typeface="Consolas" panose="020B0609020204030204" pitchFamily="49" charset="0"/>
@@ -11032,7 +12159,7 @@
           <a:p>
             <a:r>
               <a:rPr lang="en-US" dirty="0" smtClean="0"/>
-              <a:t>P/Invokes required for cross-language calls</a:t>
+              <a:t>P/Invokes are required for cross-language calls</a:t>
             </a:r>
             <a:endParaRPr lang="en-US" dirty="0"/>
           </a:p>
@@ -11106,7 +12233,7 @@
           <a:graphicData uri="http://schemas.openxmlformats.org/presentationml/2006/ole">
             <mc:AlternateContent xmlns:mc="http://schemas.openxmlformats.org/markup-compatibility/2006">
               <mc:Choice xmlns:v="urn:schemas-microsoft-com:vml" Requires="v">
-                <p:oleObj spid="_x0000_s3074" name="Visio" r:id="rId3" imgW="10572660" imgH="6962865" progId="Visio.Drawing.15">
+                <p:oleObj spid="_x0000_s3123" name="Visio" r:id="rId3" imgW="10572660" imgH="6962865" progId="Visio.Drawing.15">
                   <p:embed/>
                 </p:oleObj>
               </mc:Choice>
@@ -11211,12 +12338,68 @@
             <p:ph idx="1"/>
           </p:nvPr>
         </p:nvSpPr>
-        <p:spPr/>
-        <p:txBody>
-          <a:bodyPr/>
-          <a:lstStyle/>
-          <a:p>
-            <a:endParaRPr lang="en-US"/>
+        <p:spPr>
+          <a:xfrm>
+            <a:off x="1943807" y="1700808"/>
+            <a:ext cx="6591985" cy="3777622"/>
+          </a:xfrm>
+        </p:spPr>
+        <p:txBody>
+          <a:bodyPr/>
+          <a:lstStyle/>
+          <a:p>
+            <a:r>
+              <a:rPr lang="en-US" dirty="0" smtClean="0"/>
+              <a:t>Implemented using the provided Linux Kernel</a:t>
+            </a:r>
+            <a:r>
+              <a:rPr lang="en-US" dirty="0"/>
+              <a:t> </a:t>
+            </a:r>
+            <a:r>
+              <a:rPr lang="en-US" dirty="0" smtClean="0"/>
+              <a:t>function</a:t>
+            </a:r>
+          </a:p>
+          <a:p>
+            <a:pPr lvl="1"/>
+            <a:endParaRPr lang="en-US" dirty="0" smtClean="0"/>
+          </a:p>
+          <a:p>
+            <a:pPr lvl="1"/>
+            <a:r>
+              <a:rPr lang="en-US" dirty="0" smtClean="0"/>
+              <a:t>Included on </a:t>
+            </a:r>
+            <a:r>
+              <a:rPr lang="en-US" dirty="0" err="1" smtClean="0"/>
+              <a:t>IOSharp</a:t>
+            </a:r>
+            <a:r>
+              <a:rPr lang="en-US" dirty="0" smtClean="0"/>
+              <a:t>-C library</a:t>
+            </a:r>
+          </a:p>
+          <a:p>
+            <a:pPr lvl="1"/>
+            <a:endParaRPr lang="en-US" dirty="0" smtClean="0"/>
+          </a:p>
+          <a:p>
+            <a:pPr lvl="1"/>
+            <a:r>
+              <a:rPr lang="en-US" dirty="0" smtClean="0"/>
+              <a:t>P/Invoked from C#</a:t>
+            </a:r>
+            <a:endParaRPr lang="en-US" dirty="0"/>
+          </a:p>
+          <a:p>
+            <a:endParaRPr lang="en-US" dirty="0" smtClean="0"/>
+          </a:p>
+          <a:p>
+            <a:pPr marL="0" indent="0">
+              <a:buNone/>
+            </a:pPr>
+            <a:endParaRPr lang="en-US" dirty="0"/>
           </a:p>
         </p:txBody>
       </p:sp>
@@ -11266,6 +12449,63 @@
           </a:p>
         </p:txBody>
       </p:sp>
+      <p:graphicFrame>
+        <p:nvGraphicFramePr>
+          <p:cNvPr id="6" name="Objeto 5"/>
+          <p:cNvGraphicFramePr>
+            <a:graphicFrameLocks noChangeAspect="1"/>
+          </p:cNvGraphicFramePr>
+          <p:nvPr>
+            <p:extLst>
+              <p:ext uri="{D42A27DB-BD31-4B8C-83A1-F6EECF244321}">
+                <p14:modId xmlns:p14="http://schemas.microsoft.com/office/powerpoint/2010/main" val="1384627031"/>
+              </p:ext>
+            </p:extLst>
+          </p:nvPr>
+        </p:nvGraphicFramePr>
+        <p:xfrm>
+          <a:off x="3096674" y="3849655"/>
+          <a:ext cx="4286250" cy="1628775"/>
+        </p:xfrm>
+        <a:graphic>
+          <a:graphicData uri="http://schemas.openxmlformats.org/presentationml/2006/ole">
+            <mc:AlternateContent xmlns:mc="http://schemas.openxmlformats.org/markup-compatibility/2006">
+              <mc:Choice xmlns:v="urn:schemas-microsoft-com:vml" Requires="v">
+                <p:oleObj spid="_x0000_s4138" name="Visio" r:id="rId3" imgW="4286250" imgH="1628775" progId="Visio.Drawing.15">
+                  <p:embed/>
+                </p:oleObj>
+              </mc:Choice>
+              <mc:Fallback>
+                <p:oleObj name="Visio" r:id="rId3" imgW="4286250" imgH="1628775" progId="Visio.Drawing.15">
+                  <p:embed/>
+                  <p:pic>
+                    <p:nvPicPr>
+                      <p:cNvPr id="0" name=""/>
+                      <p:cNvPicPr/>
+                      <p:nvPr/>
+                    </p:nvPicPr>
+                    <p:blipFill>
+                      <a:blip r:embed="rId4"/>
+                      <a:stretch>
+                        <a:fillRect/>
+                      </a:stretch>
+                    </p:blipFill>
+                    <p:spPr>
+                      <a:xfrm>
+                        <a:off x="3096674" y="3849655"/>
+                        <a:ext cx="4286250" cy="1628775"/>
+                      </a:xfrm>
+                      <a:prstGeom prst="rect">
+                        <a:avLst/>
+                      </a:prstGeom>
+                    </p:spPr>
+                  </p:pic>
+                </p:oleObj>
+              </mc:Fallback>
+            </mc:AlternateContent>
+          </a:graphicData>
+        </a:graphic>
+      </p:graphicFrame>
     </p:spTree>
     <p:extLst>
       <p:ext uri="{BB962C8B-B14F-4D97-AF65-F5344CB8AC3E}">

</xml_diff>